<commit_message>
improve session 9 presentation
</commit_message>
<xml_diff>
--- a/presentations/session-9-open-issues-in-ai.pptx
+++ b/presentations/session-9-open-issues-in-ai.pptx
@@ -5,7 +5,7 @@
     <p:sldMasterId id="2147483648" r:id="rId1"/>
   </p:sldMasterIdLst>
   <p:notesMasterIdLst>
-    <p:notesMasterId r:id="rId13"/>
+    <p:notesMasterId r:id="rId18"/>
   </p:notesMasterIdLst>
   <p:sldIdLst>
     <p:sldId id="263" r:id="rId2"/>
@@ -13,12 +13,17 @@
     <p:sldId id="542" r:id="rId4"/>
     <p:sldId id="556" r:id="rId5"/>
     <p:sldId id="564" r:id="rId6"/>
-    <p:sldId id="558" r:id="rId7"/>
-    <p:sldId id="559" r:id="rId8"/>
-    <p:sldId id="560" r:id="rId9"/>
-    <p:sldId id="561" r:id="rId10"/>
-    <p:sldId id="562" r:id="rId11"/>
-    <p:sldId id="563" r:id="rId12"/>
+    <p:sldId id="565" r:id="rId7"/>
+    <p:sldId id="567" r:id="rId8"/>
+    <p:sldId id="568" r:id="rId9"/>
+    <p:sldId id="566" r:id="rId10"/>
+    <p:sldId id="558" r:id="rId11"/>
+    <p:sldId id="569" r:id="rId12"/>
+    <p:sldId id="559" r:id="rId13"/>
+    <p:sldId id="560" r:id="rId14"/>
+    <p:sldId id="561" r:id="rId15"/>
+    <p:sldId id="562" r:id="rId16"/>
+    <p:sldId id="563" r:id="rId17"/>
   </p:sldIdLst>
   <p:sldSz cx="12192000" cy="6858000"/>
   <p:notesSz cx="6797675" cy="9874250"/>
@@ -218,7 +223,7 @@
           <a:p>
             <a:fld id="{74B0C4F4-A186-4C13-8E85-1B7149B65718}" type="datetimeFigureOut">
               <a:rPr lang="en-US" smtClean="0"/>
-              <a:t>10/25/18</a:t>
+              <a:t>11/5/18</a:t>
             </a:fld>
             <a:endParaRPr lang="en-US"/>
           </a:p>
@@ -643,7 +648,7 @@
     </p:spTree>
     <p:extLst>
       <p:ext uri="{BB962C8B-B14F-4D97-AF65-F5344CB8AC3E}">
-        <p14:creationId xmlns:p14="http://schemas.microsoft.com/office/powerpoint/2010/main" val="1092752190"/>
+        <p14:creationId xmlns:p14="http://schemas.microsoft.com/office/powerpoint/2010/main" val="2780719010"/>
       </p:ext>
     </p:extLst>
   </p:cSld>
@@ -697,7 +702,18 @@
           <a:bodyPr/>
           <a:lstStyle/>
           <a:p>
-            <a:endParaRPr lang="en-US" dirty="0"/>
+            <a:r>
+              <a:rPr lang="en-US" dirty="0"/>
+              <a:t>https://</a:t>
+            </a:r>
+            <a:r>
+              <a:rPr lang="en-US" dirty="0" err="1"/>
+              <a:t>www.deeplearning.ai</a:t>
+            </a:r>
+            <a:r>
+              <a:rPr lang="en-US" dirty="0"/>
+              <a:t>/</a:t>
+            </a:r>
           </a:p>
         </p:txBody>
       </p:sp>
@@ -719,6 +735,426 @@
             <a:fld id="{2F6F93F9-6E01-423B-ABB3-8FB3B0651941}" type="slidenum">
               <a:rPr lang="en-US" smtClean="0"/>
               <a:t>11</a:t>
+            </a:fld>
+            <a:endParaRPr lang="en-US"/>
+          </a:p>
+        </p:txBody>
+      </p:sp>
+    </p:spTree>
+    <p:extLst>
+      <p:ext uri="{BB962C8B-B14F-4D97-AF65-F5344CB8AC3E}">
+        <p14:creationId xmlns:p14="http://schemas.microsoft.com/office/powerpoint/2010/main" val="3534153860"/>
+      </p:ext>
+    </p:extLst>
+  </p:cSld>
+  <p:clrMapOvr>
+    <a:masterClrMapping/>
+  </p:clrMapOvr>
+</p:notes>
+</file>
+
+<file path=ppt/notesSlides/notesSlide12.xml><?xml version="1.0" encoding="utf-8"?>
+<p:notes xmlns:a="http://schemas.openxmlformats.org/drawingml/2006/main" xmlns:r="http://schemas.openxmlformats.org/officeDocument/2006/relationships" xmlns:p="http://schemas.openxmlformats.org/presentationml/2006/main">
+  <p:cSld>
+    <p:spTree>
+      <p:nvGrpSpPr>
+        <p:cNvPr id="1" name=""/>
+        <p:cNvGrpSpPr/>
+        <p:nvPr/>
+      </p:nvGrpSpPr>
+      <p:grpSpPr>
+        <a:xfrm>
+          <a:off x="0" y="0"/>
+          <a:ext cx="0" cy="0"/>
+          <a:chOff x="0" y="0"/>
+          <a:chExt cx="0" cy="0"/>
+        </a:xfrm>
+      </p:grpSpPr>
+      <p:sp>
+        <p:nvSpPr>
+          <p:cNvPr id="2" name="Slide Image Placeholder 1"/>
+          <p:cNvSpPr>
+            <a:spLocks noGrp="1" noRot="1" noChangeAspect="1"/>
+          </p:cNvSpPr>
+          <p:nvPr>
+            <p:ph type="sldImg"/>
+          </p:nvPr>
+        </p:nvSpPr>
+        <p:spPr/>
+      </p:sp>
+      <p:sp>
+        <p:nvSpPr>
+          <p:cNvPr id="3" name="Notes Placeholder 2"/>
+          <p:cNvSpPr>
+            <a:spLocks noGrp="1"/>
+          </p:cNvSpPr>
+          <p:nvPr>
+            <p:ph type="body" idx="1"/>
+          </p:nvPr>
+        </p:nvSpPr>
+        <p:spPr/>
+        <p:txBody>
+          <a:bodyPr/>
+          <a:lstStyle/>
+          <a:p>
+            <a:endParaRPr lang="en-US" dirty="0"/>
+          </a:p>
+        </p:txBody>
+      </p:sp>
+      <p:sp>
+        <p:nvSpPr>
+          <p:cNvPr id="4" name="Slide Number Placeholder 3"/>
+          <p:cNvSpPr>
+            <a:spLocks noGrp="1"/>
+          </p:cNvSpPr>
+          <p:nvPr>
+            <p:ph type="sldNum" sz="quarter" idx="10"/>
+          </p:nvPr>
+        </p:nvSpPr>
+        <p:spPr/>
+        <p:txBody>
+          <a:bodyPr/>
+          <a:lstStyle/>
+          <a:p>
+            <a:fld id="{2F6F93F9-6E01-423B-ABB3-8FB3B0651941}" type="slidenum">
+              <a:rPr lang="en-US" smtClean="0"/>
+              <a:t>12</a:t>
+            </a:fld>
+            <a:endParaRPr lang="en-US"/>
+          </a:p>
+        </p:txBody>
+      </p:sp>
+    </p:spTree>
+    <p:extLst>
+      <p:ext uri="{BB962C8B-B14F-4D97-AF65-F5344CB8AC3E}">
+        <p14:creationId xmlns:p14="http://schemas.microsoft.com/office/powerpoint/2010/main" val="1426491306"/>
+      </p:ext>
+    </p:extLst>
+  </p:cSld>
+  <p:clrMapOvr>
+    <a:masterClrMapping/>
+  </p:clrMapOvr>
+</p:notes>
+</file>
+
+<file path=ppt/notesSlides/notesSlide13.xml><?xml version="1.0" encoding="utf-8"?>
+<p:notes xmlns:a="http://schemas.openxmlformats.org/drawingml/2006/main" xmlns:r="http://schemas.openxmlformats.org/officeDocument/2006/relationships" xmlns:p="http://schemas.openxmlformats.org/presentationml/2006/main">
+  <p:cSld>
+    <p:spTree>
+      <p:nvGrpSpPr>
+        <p:cNvPr id="1" name=""/>
+        <p:cNvGrpSpPr/>
+        <p:nvPr/>
+      </p:nvGrpSpPr>
+      <p:grpSpPr>
+        <a:xfrm>
+          <a:off x="0" y="0"/>
+          <a:ext cx="0" cy="0"/>
+          <a:chOff x="0" y="0"/>
+          <a:chExt cx="0" cy="0"/>
+        </a:xfrm>
+      </p:grpSpPr>
+      <p:sp>
+        <p:nvSpPr>
+          <p:cNvPr id="2" name="Slide Image Placeholder 1"/>
+          <p:cNvSpPr>
+            <a:spLocks noGrp="1" noRot="1" noChangeAspect="1"/>
+          </p:cNvSpPr>
+          <p:nvPr>
+            <p:ph type="sldImg"/>
+          </p:nvPr>
+        </p:nvSpPr>
+        <p:spPr/>
+      </p:sp>
+      <p:sp>
+        <p:nvSpPr>
+          <p:cNvPr id="3" name="Notes Placeholder 2"/>
+          <p:cNvSpPr>
+            <a:spLocks noGrp="1"/>
+          </p:cNvSpPr>
+          <p:nvPr>
+            <p:ph type="body" idx="1"/>
+          </p:nvPr>
+        </p:nvSpPr>
+        <p:spPr/>
+        <p:txBody>
+          <a:bodyPr/>
+          <a:lstStyle/>
+          <a:p>
+            <a:endParaRPr lang="en-US" dirty="0"/>
+          </a:p>
+        </p:txBody>
+      </p:sp>
+      <p:sp>
+        <p:nvSpPr>
+          <p:cNvPr id="4" name="Slide Number Placeholder 3"/>
+          <p:cNvSpPr>
+            <a:spLocks noGrp="1"/>
+          </p:cNvSpPr>
+          <p:nvPr>
+            <p:ph type="sldNum" sz="quarter" idx="10"/>
+          </p:nvPr>
+        </p:nvSpPr>
+        <p:spPr/>
+        <p:txBody>
+          <a:bodyPr/>
+          <a:lstStyle/>
+          <a:p>
+            <a:fld id="{2F6F93F9-6E01-423B-ABB3-8FB3B0651941}" type="slidenum">
+              <a:rPr lang="en-US" smtClean="0"/>
+              <a:t>13</a:t>
+            </a:fld>
+            <a:endParaRPr lang="en-US"/>
+          </a:p>
+        </p:txBody>
+      </p:sp>
+    </p:spTree>
+    <p:extLst>
+      <p:ext uri="{BB962C8B-B14F-4D97-AF65-F5344CB8AC3E}">
+        <p14:creationId xmlns:p14="http://schemas.microsoft.com/office/powerpoint/2010/main" val="3917118602"/>
+      </p:ext>
+    </p:extLst>
+  </p:cSld>
+  <p:clrMapOvr>
+    <a:masterClrMapping/>
+  </p:clrMapOvr>
+</p:notes>
+</file>
+
+<file path=ppt/notesSlides/notesSlide14.xml><?xml version="1.0" encoding="utf-8"?>
+<p:notes xmlns:a="http://schemas.openxmlformats.org/drawingml/2006/main" xmlns:r="http://schemas.openxmlformats.org/officeDocument/2006/relationships" xmlns:p="http://schemas.openxmlformats.org/presentationml/2006/main">
+  <p:cSld>
+    <p:spTree>
+      <p:nvGrpSpPr>
+        <p:cNvPr id="1" name=""/>
+        <p:cNvGrpSpPr/>
+        <p:nvPr/>
+      </p:nvGrpSpPr>
+      <p:grpSpPr>
+        <a:xfrm>
+          <a:off x="0" y="0"/>
+          <a:ext cx="0" cy="0"/>
+          <a:chOff x="0" y="0"/>
+          <a:chExt cx="0" cy="0"/>
+        </a:xfrm>
+      </p:grpSpPr>
+      <p:sp>
+        <p:nvSpPr>
+          <p:cNvPr id="2" name="Slide Image Placeholder 1"/>
+          <p:cNvSpPr>
+            <a:spLocks noGrp="1" noRot="1" noChangeAspect="1"/>
+          </p:cNvSpPr>
+          <p:nvPr>
+            <p:ph type="sldImg"/>
+          </p:nvPr>
+        </p:nvSpPr>
+        <p:spPr/>
+      </p:sp>
+      <p:sp>
+        <p:nvSpPr>
+          <p:cNvPr id="3" name="Notes Placeholder 2"/>
+          <p:cNvSpPr>
+            <a:spLocks noGrp="1"/>
+          </p:cNvSpPr>
+          <p:nvPr>
+            <p:ph type="body" idx="1"/>
+          </p:nvPr>
+        </p:nvSpPr>
+        <p:spPr/>
+        <p:txBody>
+          <a:bodyPr/>
+          <a:lstStyle/>
+          <a:p>
+            <a:endParaRPr lang="en-US" dirty="0"/>
+          </a:p>
+        </p:txBody>
+      </p:sp>
+      <p:sp>
+        <p:nvSpPr>
+          <p:cNvPr id="4" name="Slide Number Placeholder 3"/>
+          <p:cNvSpPr>
+            <a:spLocks noGrp="1"/>
+          </p:cNvSpPr>
+          <p:nvPr>
+            <p:ph type="sldNum" sz="quarter" idx="10"/>
+          </p:nvPr>
+        </p:nvSpPr>
+        <p:spPr/>
+        <p:txBody>
+          <a:bodyPr/>
+          <a:lstStyle/>
+          <a:p>
+            <a:fld id="{2F6F93F9-6E01-423B-ABB3-8FB3B0651941}" type="slidenum">
+              <a:rPr lang="en-US" smtClean="0"/>
+              <a:t>14</a:t>
+            </a:fld>
+            <a:endParaRPr lang="en-US"/>
+          </a:p>
+        </p:txBody>
+      </p:sp>
+    </p:spTree>
+    <p:extLst>
+      <p:ext uri="{BB962C8B-B14F-4D97-AF65-F5344CB8AC3E}">
+        <p14:creationId xmlns:p14="http://schemas.microsoft.com/office/powerpoint/2010/main" val="467430118"/>
+      </p:ext>
+    </p:extLst>
+  </p:cSld>
+  <p:clrMapOvr>
+    <a:masterClrMapping/>
+  </p:clrMapOvr>
+</p:notes>
+</file>
+
+<file path=ppt/notesSlides/notesSlide15.xml><?xml version="1.0" encoding="utf-8"?>
+<p:notes xmlns:a="http://schemas.openxmlformats.org/drawingml/2006/main" xmlns:r="http://schemas.openxmlformats.org/officeDocument/2006/relationships" xmlns:p="http://schemas.openxmlformats.org/presentationml/2006/main">
+  <p:cSld>
+    <p:spTree>
+      <p:nvGrpSpPr>
+        <p:cNvPr id="1" name=""/>
+        <p:cNvGrpSpPr/>
+        <p:nvPr/>
+      </p:nvGrpSpPr>
+      <p:grpSpPr>
+        <a:xfrm>
+          <a:off x="0" y="0"/>
+          <a:ext cx="0" cy="0"/>
+          <a:chOff x="0" y="0"/>
+          <a:chExt cx="0" cy="0"/>
+        </a:xfrm>
+      </p:grpSpPr>
+      <p:sp>
+        <p:nvSpPr>
+          <p:cNvPr id="2" name="Slide Image Placeholder 1"/>
+          <p:cNvSpPr>
+            <a:spLocks noGrp="1" noRot="1" noChangeAspect="1"/>
+          </p:cNvSpPr>
+          <p:nvPr>
+            <p:ph type="sldImg"/>
+          </p:nvPr>
+        </p:nvSpPr>
+        <p:spPr/>
+      </p:sp>
+      <p:sp>
+        <p:nvSpPr>
+          <p:cNvPr id="3" name="Notes Placeholder 2"/>
+          <p:cNvSpPr>
+            <a:spLocks noGrp="1"/>
+          </p:cNvSpPr>
+          <p:nvPr>
+            <p:ph type="body" idx="1"/>
+          </p:nvPr>
+        </p:nvSpPr>
+        <p:spPr/>
+        <p:txBody>
+          <a:bodyPr/>
+          <a:lstStyle/>
+          <a:p>
+            <a:endParaRPr lang="en-US" dirty="0"/>
+          </a:p>
+        </p:txBody>
+      </p:sp>
+      <p:sp>
+        <p:nvSpPr>
+          <p:cNvPr id="4" name="Slide Number Placeholder 3"/>
+          <p:cNvSpPr>
+            <a:spLocks noGrp="1"/>
+          </p:cNvSpPr>
+          <p:nvPr>
+            <p:ph type="sldNum" sz="quarter" idx="10"/>
+          </p:nvPr>
+        </p:nvSpPr>
+        <p:spPr/>
+        <p:txBody>
+          <a:bodyPr/>
+          <a:lstStyle/>
+          <a:p>
+            <a:fld id="{2F6F93F9-6E01-423B-ABB3-8FB3B0651941}" type="slidenum">
+              <a:rPr lang="en-US" smtClean="0"/>
+              <a:t>15</a:t>
+            </a:fld>
+            <a:endParaRPr lang="en-US"/>
+          </a:p>
+        </p:txBody>
+      </p:sp>
+    </p:spTree>
+    <p:extLst>
+      <p:ext uri="{BB962C8B-B14F-4D97-AF65-F5344CB8AC3E}">
+        <p14:creationId xmlns:p14="http://schemas.microsoft.com/office/powerpoint/2010/main" val="1092752190"/>
+      </p:ext>
+    </p:extLst>
+  </p:cSld>
+  <p:clrMapOvr>
+    <a:masterClrMapping/>
+  </p:clrMapOvr>
+</p:notes>
+</file>
+
+<file path=ppt/notesSlides/notesSlide16.xml><?xml version="1.0" encoding="utf-8"?>
+<p:notes xmlns:a="http://schemas.openxmlformats.org/drawingml/2006/main" xmlns:r="http://schemas.openxmlformats.org/officeDocument/2006/relationships" xmlns:p="http://schemas.openxmlformats.org/presentationml/2006/main">
+  <p:cSld>
+    <p:spTree>
+      <p:nvGrpSpPr>
+        <p:cNvPr id="1" name=""/>
+        <p:cNvGrpSpPr/>
+        <p:nvPr/>
+      </p:nvGrpSpPr>
+      <p:grpSpPr>
+        <a:xfrm>
+          <a:off x="0" y="0"/>
+          <a:ext cx="0" cy="0"/>
+          <a:chOff x="0" y="0"/>
+          <a:chExt cx="0" cy="0"/>
+        </a:xfrm>
+      </p:grpSpPr>
+      <p:sp>
+        <p:nvSpPr>
+          <p:cNvPr id="2" name="Slide Image Placeholder 1"/>
+          <p:cNvSpPr>
+            <a:spLocks noGrp="1" noRot="1" noChangeAspect="1"/>
+          </p:cNvSpPr>
+          <p:nvPr>
+            <p:ph type="sldImg"/>
+          </p:nvPr>
+        </p:nvSpPr>
+        <p:spPr/>
+      </p:sp>
+      <p:sp>
+        <p:nvSpPr>
+          <p:cNvPr id="3" name="Notes Placeholder 2"/>
+          <p:cNvSpPr>
+            <a:spLocks noGrp="1"/>
+          </p:cNvSpPr>
+          <p:nvPr>
+            <p:ph type="body" idx="1"/>
+          </p:nvPr>
+        </p:nvSpPr>
+        <p:spPr/>
+        <p:txBody>
+          <a:bodyPr/>
+          <a:lstStyle/>
+          <a:p>
+            <a:endParaRPr lang="en-US" dirty="0"/>
+          </a:p>
+        </p:txBody>
+      </p:sp>
+      <p:sp>
+        <p:nvSpPr>
+          <p:cNvPr id="4" name="Slide Number Placeholder 3"/>
+          <p:cNvSpPr>
+            <a:spLocks noGrp="1"/>
+          </p:cNvSpPr>
+          <p:nvPr>
+            <p:ph type="sldNum" sz="quarter" idx="10"/>
+          </p:nvPr>
+        </p:nvSpPr>
+        <p:spPr/>
+        <p:txBody>
+          <a:bodyPr/>
+          <a:lstStyle/>
+          <a:p>
+            <a:fld id="{2F6F93F9-6E01-423B-ABB3-8FB3B0651941}" type="slidenum">
+              <a:rPr lang="en-US" smtClean="0"/>
+              <a:t>16</a:t>
             </a:fld>
             <a:endParaRPr lang="en-US"/>
           </a:p>
@@ -1151,7 +1587,7 @@
     </p:spTree>
     <p:extLst>
       <p:ext uri="{BB962C8B-B14F-4D97-AF65-F5344CB8AC3E}">
-        <p14:creationId xmlns:p14="http://schemas.microsoft.com/office/powerpoint/2010/main" val="2780719010"/>
+        <p14:creationId xmlns:p14="http://schemas.microsoft.com/office/powerpoint/2010/main" val="1078903008"/>
       </p:ext>
     </p:extLst>
   </p:cSld>
@@ -1205,6 +1641,20 @@
           <a:bodyPr/>
           <a:lstStyle/>
           <a:p>
+            <a:r>
+              <a:rPr lang="en-US" dirty="0"/>
+              <a:t>The example of https://</a:t>
+            </a:r>
+            <a:r>
+              <a:rPr lang="en-US" dirty="0" err="1"/>
+              <a:t>landing.ai</a:t>
+            </a:r>
+            <a:r>
+              <a:rPr lang="en-US" dirty="0"/>
+              <a:t>/ initiative</a:t>
+            </a:r>
+          </a:p>
+          <a:p>
             <a:endParaRPr lang="en-US" dirty="0"/>
           </a:p>
         </p:txBody>
@@ -1235,7 +1685,7 @@
     </p:spTree>
     <p:extLst>
       <p:ext uri="{BB962C8B-B14F-4D97-AF65-F5344CB8AC3E}">
-        <p14:creationId xmlns:p14="http://schemas.microsoft.com/office/powerpoint/2010/main" val="1426491306"/>
+        <p14:creationId xmlns:p14="http://schemas.microsoft.com/office/powerpoint/2010/main" val="3178925709"/>
       </p:ext>
     </p:extLst>
   </p:cSld>
@@ -1289,6 +1739,14 @@
           <a:bodyPr/>
           <a:lstStyle/>
           <a:p>
+            <a:r>
+              <a:rPr lang="en-US" dirty="0"/>
+              <a:t>+ Virtual </a:t>
+            </a:r>
+            <a:r>
+              <a:rPr lang="en-US" dirty="0" err="1"/>
+              <a:t>environements</a:t>
+            </a:r>
             <a:endParaRPr lang="en-US" dirty="0"/>
           </a:p>
         </p:txBody>
@@ -1319,7 +1777,7 @@
     </p:spTree>
     <p:extLst>
       <p:ext uri="{BB962C8B-B14F-4D97-AF65-F5344CB8AC3E}">
-        <p14:creationId xmlns:p14="http://schemas.microsoft.com/office/powerpoint/2010/main" val="3917118602"/>
+        <p14:creationId xmlns:p14="http://schemas.microsoft.com/office/powerpoint/2010/main" val="42429649"/>
       </p:ext>
     </p:extLst>
   </p:cSld>
@@ -1373,7 +1831,18 @@
           <a:bodyPr/>
           <a:lstStyle/>
           <a:p>
-            <a:endParaRPr lang="en-US" dirty="0"/>
+            <a:r>
+              <a:rPr lang="en-US" dirty="0"/>
+              <a:t>https://</a:t>
+            </a:r>
+            <a:r>
+              <a:rPr lang="en-US" dirty="0" err="1"/>
+              <a:t>www.deeplearning.ai</a:t>
+            </a:r>
+            <a:r>
+              <a:rPr lang="en-US" dirty="0"/>
+              <a:t>/</a:t>
+            </a:r>
           </a:p>
         </p:txBody>
       </p:sp>
@@ -1403,7 +1872,7 @@
     </p:spTree>
     <p:extLst>
       <p:ext uri="{BB962C8B-B14F-4D97-AF65-F5344CB8AC3E}">
-        <p14:creationId xmlns:p14="http://schemas.microsoft.com/office/powerpoint/2010/main" val="467430118"/>
+        <p14:creationId xmlns:p14="http://schemas.microsoft.com/office/powerpoint/2010/main" val="3749979836"/>
       </p:ext>
     </p:extLst>
   </p:cSld>
@@ -4204,6 +4673,502 @@
                 </a:solidFill>
                 <a:latin typeface="Cambria" panose="02040503050406030204" pitchFamily="18" charset="0"/>
               </a:rPr>
+              <a:t>NARROW VS. GENERAL INTELLIGENCE</a:t>
+            </a:r>
+          </a:p>
+        </p:txBody>
+      </p:sp>
+    </p:spTree>
+    <p:extLst>
+      <p:ext uri="{BB962C8B-B14F-4D97-AF65-F5344CB8AC3E}">
+        <p14:creationId xmlns:p14="http://schemas.microsoft.com/office/powerpoint/2010/main" val="1581891547"/>
+      </p:ext>
+    </p:extLst>
+  </p:cSld>
+  <p:clrMapOvr>
+    <a:masterClrMapping/>
+  </p:clrMapOvr>
+  <mc:AlternateContent xmlns:mc="http://schemas.openxmlformats.org/markup-compatibility/2006" xmlns:p14="http://schemas.microsoft.com/office/powerpoint/2010/main">
+    <mc:Choice Requires="p14">
+      <p:transition spd="med" p14:dur="700">
+        <p:fade/>
+      </p:transition>
+    </mc:Choice>
+    <mc:Fallback xmlns="">
+      <p:transition spd="med">
+        <p:fade/>
+      </p:transition>
+    </mc:Fallback>
+  </mc:AlternateContent>
+</p:sld>
+</file>
+
+<file path=ppt/slides/slide11.xml><?xml version="1.0" encoding="utf-8"?>
+<p:sld xmlns:a="http://schemas.openxmlformats.org/drawingml/2006/main" xmlns:r="http://schemas.openxmlformats.org/officeDocument/2006/relationships" xmlns:p="http://schemas.openxmlformats.org/presentationml/2006/main">
+  <p:cSld>
+    <p:spTree>
+      <p:nvGrpSpPr>
+        <p:cNvPr id="1" name=""/>
+        <p:cNvGrpSpPr/>
+        <p:nvPr/>
+      </p:nvGrpSpPr>
+      <p:grpSpPr>
+        <a:xfrm>
+          <a:off x="0" y="0"/>
+          <a:ext cx="0" cy="0"/>
+          <a:chOff x="0" y="0"/>
+          <a:chExt cx="0" cy="0"/>
+        </a:xfrm>
+      </p:grpSpPr>
+      <p:sp>
+        <p:nvSpPr>
+          <p:cNvPr id="8" name="TextBox 7"/>
+          <p:cNvSpPr txBox="1"/>
+          <p:nvPr/>
+        </p:nvSpPr>
+        <p:spPr>
+          <a:xfrm>
+            <a:off x="1271768" y="1115051"/>
+            <a:ext cx="9196386" cy="553998"/>
+          </a:xfrm>
+          <a:prstGeom prst="rect">
+            <a:avLst/>
+          </a:prstGeom>
+          <a:noFill/>
+        </p:spPr>
+        <p:txBody>
+          <a:bodyPr wrap="square" rtlCol="0">
+            <a:spAutoFit/>
+          </a:bodyPr>
+          <a:lstStyle/>
+          <a:p>
+            <a:r>
+              <a:rPr lang="en-US" sz="3000" b="1" dirty="0">
+                <a:solidFill>
+                  <a:schemeClr val="accent1"/>
+                </a:solidFill>
+                <a:latin typeface="Cambria" panose="02040503050406030204" pitchFamily="18" charset="0"/>
+              </a:rPr>
+              <a:t>DOMAIN-SPECIFIC AND LACK OF GENERALIZATION</a:t>
+            </a:r>
+          </a:p>
+        </p:txBody>
+      </p:sp>
+      <p:sp>
+        <p:nvSpPr>
+          <p:cNvPr id="6" name="TextBox 5">
+            <a:extLst>
+              <a:ext uri="{FF2B5EF4-FFF2-40B4-BE49-F238E27FC236}">
+                <a16:creationId xmlns:a16="http://schemas.microsoft.com/office/drawing/2014/main" id="{80CDDE41-8C09-D54C-917C-9FB77CE4824D}"/>
+              </a:ext>
+            </a:extLst>
+          </p:cNvPr>
+          <p:cNvSpPr txBox="1"/>
+          <p:nvPr/>
+        </p:nvSpPr>
+        <p:spPr>
+          <a:xfrm>
+            <a:off x="1275701" y="2333156"/>
+            <a:ext cx="9909364" cy="2308324"/>
+          </a:xfrm>
+          <a:prstGeom prst="rect">
+            <a:avLst/>
+          </a:prstGeom>
+          <a:noFill/>
+        </p:spPr>
+        <p:txBody>
+          <a:bodyPr wrap="square" rtlCol="0">
+            <a:spAutoFit/>
+          </a:bodyPr>
+          <a:lstStyle/>
+          <a:p>
+            <a:pPr marL="342900" indent="-342900">
+              <a:buFont typeface="Arial"/>
+              <a:buChar char="•"/>
+            </a:pPr>
+            <a:r>
+              <a:rPr lang="en-US" sz="2400" b="1" dirty="0">
+                <a:solidFill>
+                  <a:schemeClr val="accent1"/>
+                </a:solidFill>
+                <a:latin typeface="Cambria" panose="02040503050406030204" pitchFamily="18" charset="0"/>
+              </a:rPr>
+              <a:t>ONLINE COURSES</a:t>
+            </a:r>
+            <a:br>
+              <a:rPr lang="en-US" sz="2400" b="1" dirty="0">
+                <a:solidFill>
+                  <a:schemeClr val="accent1"/>
+                </a:solidFill>
+                <a:latin typeface="Cambria" panose="02040503050406030204" pitchFamily="18" charset="0"/>
+              </a:rPr>
+            </a:br>
+            <a:endParaRPr lang="en-US" sz="2400" b="1" dirty="0">
+              <a:solidFill>
+                <a:schemeClr val="accent1"/>
+              </a:solidFill>
+              <a:latin typeface="Cambria" panose="02040503050406030204" pitchFamily="18" charset="0"/>
+            </a:endParaRPr>
+          </a:p>
+          <a:p>
+            <a:pPr marL="342900" indent="-342900">
+              <a:buFont typeface="Arial"/>
+              <a:buChar char="•"/>
+            </a:pPr>
+            <a:r>
+              <a:rPr lang="en-US" sz="2400" b="1" dirty="0">
+                <a:solidFill>
+                  <a:schemeClr val="accent1"/>
+                </a:solidFill>
+                <a:latin typeface="Cambria" panose="02040503050406030204" pitchFamily="18" charset="0"/>
+              </a:rPr>
+              <a:t>BEST PRACTICES</a:t>
+            </a:r>
+            <a:br>
+              <a:rPr lang="en-US" sz="2400" b="1" dirty="0">
+                <a:solidFill>
+                  <a:schemeClr val="accent1"/>
+                </a:solidFill>
+                <a:latin typeface="Cambria" panose="02040503050406030204" pitchFamily="18" charset="0"/>
+              </a:rPr>
+            </a:br>
+            <a:endParaRPr lang="en-US" sz="2400" b="1" dirty="0">
+              <a:solidFill>
+                <a:schemeClr val="accent1"/>
+              </a:solidFill>
+              <a:latin typeface="Cambria" panose="02040503050406030204" pitchFamily="18" charset="0"/>
+            </a:endParaRPr>
+          </a:p>
+          <a:p>
+            <a:pPr marL="342900" indent="-342900">
+              <a:buFont typeface="Arial"/>
+              <a:buChar char="•"/>
+            </a:pPr>
+            <a:r>
+              <a:rPr lang="en-US" sz="2400" b="1" dirty="0">
+                <a:solidFill>
+                  <a:schemeClr val="accent1"/>
+                </a:solidFill>
+                <a:latin typeface="Cambria" panose="02040503050406030204" pitchFamily="18" charset="0"/>
+              </a:rPr>
+              <a:t>COMPETITIONS</a:t>
+            </a:r>
+            <a:br>
+              <a:rPr lang="en-US" sz="2400" b="1" dirty="0">
+                <a:solidFill>
+                  <a:schemeClr val="accent1"/>
+                </a:solidFill>
+                <a:latin typeface="Cambria" panose="02040503050406030204" pitchFamily="18" charset="0"/>
+              </a:rPr>
+            </a:br>
+            <a:endParaRPr lang="en-US" sz="2400" b="1" dirty="0">
+              <a:solidFill>
+                <a:schemeClr val="accent1"/>
+              </a:solidFill>
+              <a:latin typeface="Cambria" panose="02040503050406030204" pitchFamily="18" charset="0"/>
+            </a:endParaRPr>
+          </a:p>
+        </p:txBody>
+      </p:sp>
+    </p:spTree>
+    <p:extLst>
+      <p:ext uri="{BB962C8B-B14F-4D97-AF65-F5344CB8AC3E}">
+        <p14:creationId xmlns:p14="http://schemas.microsoft.com/office/powerpoint/2010/main" val="3105999542"/>
+      </p:ext>
+    </p:extLst>
+  </p:cSld>
+  <p:clrMapOvr>
+    <a:masterClrMapping/>
+  </p:clrMapOvr>
+  <mc:AlternateContent xmlns:mc="http://schemas.openxmlformats.org/markup-compatibility/2006" xmlns:p14="http://schemas.microsoft.com/office/powerpoint/2010/main">
+    <mc:Choice Requires="p14">
+      <p:transition spd="med" p14:dur="700">
+        <p:fade/>
+      </p:transition>
+    </mc:Choice>
+    <mc:Fallback xmlns="">
+      <p:transition spd="med">
+        <p:fade/>
+      </p:transition>
+    </mc:Fallback>
+  </mc:AlternateContent>
+</p:sld>
+</file>
+
+<file path=ppt/slides/slide12.xml><?xml version="1.0" encoding="utf-8"?>
+<p:sld xmlns:a="http://schemas.openxmlformats.org/drawingml/2006/main" xmlns:r="http://schemas.openxmlformats.org/officeDocument/2006/relationships" xmlns:p="http://schemas.openxmlformats.org/presentationml/2006/main">
+  <p:cSld>
+    <p:spTree>
+      <p:nvGrpSpPr>
+        <p:cNvPr id="1" name=""/>
+        <p:cNvGrpSpPr/>
+        <p:nvPr/>
+      </p:nvGrpSpPr>
+      <p:grpSpPr>
+        <a:xfrm>
+          <a:off x="0" y="0"/>
+          <a:ext cx="0" cy="0"/>
+          <a:chOff x="0" y="0"/>
+          <a:chExt cx="0" cy="0"/>
+        </a:xfrm>
+      </p:grpSpPr>
+      <p:sp>
+        <p:nvSpPr>
+          <p:cNvPr id="8" name="TextBox 7"/>
+          <p:cNvSpPr txBox="1"/>
+          <p:nvPr/>
+        </p:nvSpPr>
+        <p:spPr>
+          <a:xfrm>
+            <a:off x="1271768" y="1115051"/>
+            <a:ext cx="9196386" cy="630942"/>
+          </a:xfrm>
+          <a:prstGeom prst="rect">
+            <a:avLst/>
+          </a:prstGeom>
+          <a:noFill/>
+        </p:spPr>
+        <p:txBody>
+          <a:bodyPr wrap="square" rtlCol="0">
+            <a:spAutoFit/>
+          </a:bodyPr>
+          <a:lstStyle/>
+          <a:p>
+            <a:r>
+              <a:rPr lang="en-US" sz="3500" b="1" dirty="0">
+                <a:solidFill>
+                  <a:schemeClr val="accent1"/>
+                </a:solidFill>
+                <a:latin typeface="Cambria" panose="02040503050406030204" pitchFamily="18" charset="0"/>
+              </a:rPr>
+              <a:t>DATA GREEDINESS</a:t>
+            </a:r>
+          </a:p>
+        </p:txBody>
+      </p:sp>
+    </p:spTree>
+    <p:extLst>
+      <p:ext uri="{BB962C8B-B14F-4D97-AF65-F5344CB8AC3E}">
+        <p14:creationId xmlns:p14="http://schemas.microsoft.com/office/powerpoint/2010/main" val="1108266415"/>
+      </p:ext>
+    </p:extLst>
+  </p:cSld>
+  <p:clrMapOvr>
+    <a:masterClrMapping/>
+  </p:clrMapOvr>
+  <mc:AlternateContent xmlns:mc="http://schemas.openxmlformats.org/markup-compatibility/2006" xmlns:p14="http://schemas.microsoft.com/office/powerpoint/2010/main">
+    <mc:Choice Requires="p14">
+      <p:transition spd="med" p14:dur="700">
+        <p:fade/>
+      </p:transition>
+    </mc:Choice>
+    <mc:Fallback xmlns="">
+      <p:transition spd="med">
+        <p:fade/>
+      </p:transition>
+    </mc:Fallback>
+  </mc:AlternateContent>
+</p:sld>
+</file>
+
+<file path=ppt/slides/slide13.xml><?xml version="1.0" encoding="utf-8"?>
+<p:sld xmlns:a="http://schemas.openxmlformats.org/drawingml/2006/main" xmlns:r="http://schemas.openxmlformats.org/officeDocument/2006/relationships" xmlns:p="http://schemas.openxmlformats.org/presentationml/2006/main">
+  <p:cSld>
+    <p:spTree>
+      <p:nvGrpSpPr>
+        <p:cNvPr id="1" name=""/>
+        <p:cNvGrpSpPr/>
+        <p:nvPr/>
+      </p:nvGrpSpPr>
+      <p:grpSpPr>
+        <a:xfrm>
+          <a:off x="0" y="0"/>
+          <a:ext cx="0" cy="0"/>
+          <a:chOff x="0" y="0"/>
+          <a:chExt cx="0" cy="0"/>
+        </a:xfrm>
+      </p:grpSpPr>
+      <p:sp>
+        <p:nvSpPr>
+          <p:cNvPr id="8" name="TextBox 7"/>
+          <p:cNvSpPr txBox="1"/>
+          <p:nvPr/>
+        </p:nvSpPr>
+        <p:spPr>
+          <a:xfrm>
+            <a:off x="1271768" y="1115051"/>
+            <a:ext cx="9196386" cy="1169551"/>
+          </a:xfrm>
+          <a:prstGeom prst="rect">
+            <a:avLst/>
+          </a:prstGeom>
+          <a:noFill/>
+        </p:spPr>
+        <p:txBody>
+          <a:bodyPr wrap="square" rtlCol="0">
+            <a:spAutoFit/>
+          </a:bodyPr>
+          <a:lstStyle/>
+          <a:p>
+            <a:r>
+              <a:rPr lang="en-US" sz="3500" b="1" dirty="0">
+                <a:solidFill>
+                  <a:schemeClr val="accent1"/>
+                </a:solidFill>
+                <a:latin typeface="Cambria" panose="02040503050406030204" pitchFamily="18" charset="0"/>
+              </a:rPr>
+              <a:t>ENTREPRENEURS &amp; VENTURE CAPITAL ECOSYSTEMS</a:t>
+            </a:r>
+          </a:p>
+        </p:txBody>
+      </p:sp>
+    </p:spTree>
+    <p:extLst>
+      <p:ext uri="{BB962C8B-B14F-4D97-AF65-F5344CB8AC3E}">
+        <p14:creationId xmlns:p14="http://schemas.microsoft.com/office/powerpoint/2010/main" val="983120470"/>
+      </p:ext>
+    </p:extLst>
+  </p:cSld>
+  <p:clrMapOvr>
+    <a:masterClrMapping/>
+  </p:clrMapOvr>
+  <mc:AlternateContent xmlns:mc="http://schemas.openxmlformats.org/markup-compatibility/2006" xmlns:p14="http://schemas.microsoft.com/office/powerpoint/2010/main">
+    <mc:Choice Requires="p14">
+      <p:transition spd="med" p14:dur="700">
+        <p:fade/>
+      </p:transition>
+    </mc:Choice>
+    <mc:Fallback xmlns="">
+      <p:transition spd="med">
+        <p:fade/>
+      </p:transition>
+    </mc:Fallback>
+  </mc:AlternateContent>
+</p:sld>
+</file>
+
+<file path=ppt/slides/slide14.xml><?xml version="1.0" encoding="utf-8"?>
+<p:sld xmlns:a="http://schemas.openxmlformats.org/drawingml/2006/main" xmlns:r="http://schemas.openxmlformats.org/officeDocument/2006/relationships" xmlns:p="http://schemas.openxmlformats.org/presentationml/2006/main">
+  <p:cSld>
+    <p:spTree>
+      <p:nvGrpSpPr>
+        <p:cNvPr id="1" name=""/>
+        <p:cNvGrpSpPr/>
+        <p:nvPr/>
+      </p:nvGrpSpPr>
+      <p:grpSpPr>
+        <a:xfrm>
+          <a:off x="0" y="0"/>
+          <a:ext cx="0" cy="0"/>
+          <a:chOff x="0" y="0"/>
+          <a:chExt cx="0" cy="0"/>
+        </a:xfrm>
+      </p:grpSpPr>
+      <p:sp>
+        <p:nvSpPr>
+          <p:cNvPr id="8" name="TextBox 7"/>
+          <p:cNvSpPr txBox="1"/>
+          <p:nvPr/>
+        </p:nvSpPr>
+        <p:spPr>
+          <a:xfrm>
+            <a:off x="1271768" y="1115051"/>
+            <a:ext cx="9196386" cy="630942"/>
+          </a:xfrm>
+          <a:prstGeom prst="rect">
+            <a:avLst/>
+          </a:prstGeom>
+          <a:noFill/>
+        </p:spPr>
+        <p:txBody>
+          <a:bodyPr wrap="square" rtlCol="0">
+            <a:spAutoFit/>
+          </a:bodyPr>
+          <a:lstStyle/>
+          <a:p>
+            <a:r>
+              <a:rPr lang="en-US" sz="3500" b="1" dirty="0">
+                <a:solidFill>
+                  <a:schemeClr val="accent1"/>
+                </a:solidFill>
+                <a:latin typeface="Cambria" panose="02040503050406030204" pitchFamily="18" charset="0"/>
+              </a:rPr>
+              <a:t>THE WINNER-TAKE ALL ECONOMICS</a:t>
+            </a:r>
+          </a:p>
+        </p:txBody>
+      </p:sp>
+    </p:spTree>
+    <p:extLst>
+      <p:ext uri="{BB962C8B-B14F-4D97-AF65-F5344CB8AC3E}">
+        <p14:creationId xmlns:p14="http://schemas.microsoft.com/office/powerpoint/2010/main" val="3740597422"/>
+      </p:ext>
+    </p:extLst>
+  </p:cSld>
+  <p:clrMapOvr>
+    <a:masterClrMapping/>
+  </p:clrMapOvr>
+  <mc:AlternateContent xmlns:mc="http://schemas.openxmlformats.org/markup-compatibility/2006" xmlns:p14="http://schemas.microsoft.com/office/powerpoint/2010/main">
+    <mc:Choice Requires="p14">
+      <p:transition spd="med" p14:dur="700">
+        <p:fade/>
+      </p:transition>
+    </mc:Choice>
+    <mc:Fallback xmlns="">
+      <p:transition spd="med">
+        <p:fade/>
+      </p:transition>
+    </mc:Fallback>
+  </mc:AlternateContent>
+</p:sld>
+</file>
+
+<file path=ppt/slides/slide15.xml><?xml version="1.0" encoding="utf-8"?>
+<p:sld xmlns:a="http://schemas.openxmlformats.org/drawingml/2006/main" xmlns:r="http://schemas.openxmlformats.org/officeDocument/2006/relationships" xmlns:p="http://schemas.openxmlformats.org/presentationml/2006/main">
+  <p:cSld>
+    <p:spTree>
+      <p:nvGrpSpPr>
+        <p:cNvPr id="1" name=""/>
+        <p:cNvGrpSpPr/>
+        <p:nvPr/>
+      </p:nvGrpSpPr>
+      <p:grpSpPr>
+        <a:xfrm>
+          <a:off x="0" y="0"/>
+          <a:ext cx="0" cy="0"/>
+          <a:chOff x="0" y="0"/>
+          <a:chExt cx="0" cy="0"/>
+        </a:xfrm>
+      </p:grpSpPr>
+      <p:sp>
+        <p:nvSpPr>
+          <p:cNvPr id="8" name="TextBox 7"/>
+          <p:cNvSpPr txBox="1"/>
+          <p:nvPr/>
+        </p:nvSpPr>
+        <p:spPr>
+          <a:xfrm>
+            <a:off x="1271768" y="1115051"/>
+            <a:ext cx="9196386" cy="630942"/>
+          </a:xfrm>
+          <a:prstGeom prst="rect">
+            <a:avLst/>
+          </a:prstGeom>
+          <a:noFill/>
+        </p:spPr>
+        <p:txBody>
+          <a:bodyPr wrap="square" rtlCol="0">
+            <a:spAutoFit/>
+          </a:bodyPr>
+          <a:lstStyle/>
+          <a:p>
+            <a:r>
+              <a:rPr lang="en-US" sz="3500" b="1" dirty="0">
+                <a:solidFill>
+                  <a:schemeClr val="accent1"/>
+                </a:solidFill>
+                <a:latin typeface="Cambria" panose="02040503050406030204" pitchFamily="18" charset="0"/>
+              </a:rPr>
               <a:t>MEDIA-ATTENTION DISTORTS REALITY</a:t>
             </a:r>
           </a:p>
@@ -4234,7 +5199,7 @@
 </p:sld>
 </file>
 
-<file path=ppt/slides/slide11.xml><?xml version="1.0" encoding="utf-8"?>
+<file path=ppt/slides/slide16.xml><?xml version="1.0" encoding="utf-8"?>
 <p:sld xmlns:a="http://schemas.openxmlformats.org/drawingml/2006/main" xmlns:r="http://schemas.openxmlformats.org/officeDocument/2006/relationships" xmlns:p="http://schemas.openxmlformats.org/presentationml/2006/main">
   <p:cSld>
     <p:spTree>
@@ -4938,7 +5903,7 @@
         <p:spPr>
           <a:xfrm>
             <a:off x="1271768" y="1115051"/>
-            <a:ext cx="9196386" cy="630942"/>
+            <a:ext cx="9196386" cy="553998"/>
           </a:xfrm>
           <a:prstGeom prst="rect">
             <a:avLst/>
@@ -4952,21 +5917,137 @@
           <a:lstStyle/>
           <a:p>
             <a:r>
-              <a:rPr lang="en-US" sz="3500" b="1" dirty="0">
+              <a:rPr lang="en-US" sz="3000" b="1" dirty="0">
                 <a:solidFill>
                   <a:schemeClr val="accent1"/>
                 </a:solidFill>
                 <a:latin typeface="Cambria" panose="02040503050406030204" pitchFamily="18" charset="0"/>
               </a:rPr>
-              <a:t>NARROW VS. GENERAL INTELLIGENCE</a:t>
-            </a:r>
+              <a:t>ASSESSING SCIENTIFIC PAPERS</a:t>
+            </a:r>
+          </a:p>
+        </p:txBody>
+      </p:sp>
+      <p:sp>
+        <p:nvSpPr>
+          <p:cNvPr id="6" name="TextBox 5">
+            <a:extLst>
+              <a:ext uri="{FF2B5EF4-FFF2-40B4-BE49-F238E27FC236}">
+                <a16:creationId xmlns:a16="http://schemas.microsoft.com/office/drawing/2014/main" id="{80CDDE41-8C09-D54C-917C-9FB77CE4824D}"/>
+              </a:ext>
+            </a:extLst>
+          </p:cNvPr>
+          <p:cNvSpPr txBox="1"/>
+          <p:nvPr/>
+        </p:nvSpPr>
+        <p:spPr>
+          <a:xfrm>
+            <a:off x="1275701" y="2333156"/>
+            <a:ext cx="9909364" cy="2308324"/>
+          </a:xfrm>
+          <a:prstGeom prst="rect">
+            <a:avLst/>
+          </a:prstGeom>
+          <a:noFill/>
+        </p:spPr>
+        <p:txBody>
+          <a:bodyPr wrap="square" rtlCol="0">
+            <a:spAutoFit/>
+          </a:bodyPr>
+          <a:lstStyle/>
+          <a:p>
+            <a:pPr marL="342900" indent="-342900">
+              <a:buFont typeface="Arial"/>
+              <a:buChar char="•"/>
+            </a:pPr>
+            <a:r>
+              <a:rPr lang="en-US" sz="2400" b="1" dirty="0">
+                <a:solidFill>
+                  <a:schemeClr val="accent1"/>
+                </a:solidFill>
+                <a:latin typeface="Cambria" panose="02040503050406030204" pitchFamily="18" charset="0"/>
+              </a:rPr>
+              <a:t>FLOOD OF MEDIA ATTENTION MIGHT DISTORT REALITY</a:t>
+            </a:r>
+            <a:br>
+              <a:rPr lang="en-US" sz="2400" b="1" dirty="0">
+                <a:solidFill>
+                  <a:schemeClr val="accent1"/>
+                </a:solidFill>
+                <a:latin typeface="Cambria" panose="02040503050406030204" pitchFamily="18" charset="0"/>
+              </a:rPr>
+            </a:br>
+            <a:endParaRPr lang="en-US" sz="2400" b="1" dirty="0">
+              <a:solidFill>
+                <a:schemeClr val="accent1"/>
+              </a:solidFill>
+              <a:latin typeface="Cambria" panose="02040503050406030204" pitchFamily="18" charset="0"/>
+            </a:endParaRPr>
+          </a:p>
+          <a:p>
+            <a:pPr marL="342900" indent="-342900">
+              <a:buFont typeface="Arial"/>
+              <a:buChar char="•"/>
+            </a:pPr>
+            <a:r>
+              <a:rPr lang="en-US" sz="2400" b="1" dirty="0">
+                <a:solidFill>
+                  <a:schemeClr val="accent1"/>
+                </a:solidFill>
+                <a:latin typeface="Cambria" panose="02040503050406030204" pitchFamily="18" charset="0"/>
+              </a:rPr>
+              <a:t>CAREFULLY ASSESS ACHIEVEMENTS, HYPOTHESIS, TRICKS, …</a:t>
+            </a:r>
+            <a:br>
+              <a:rPr lang="en-US" sz="2400" b="1" dirty="0">
+                <a:solidFill>
+                  <a:schemeClr val="accent1"/>
+                </a:solidFill>
+                <a:latin typeface="Cambria" panose="02040503050406030204" pitchFamily="18" charset="0"/>
+              </a:rPr>
+            </a:br>
+            <a:endParaRPr lang="en-US" sz="2400" b="1" dirty="0">
+              <a:solidFill>
+                <a:schemeClr val="accent1"/>
+              </a:solidFill>
+              <a:latin typeface="Cambria" panose="02040503050406030204" pitchFamily="18" charset="0"/>
+            </a:endParaRPr>
+          </a:p>
+          <a:p>
+            <a:pPr marL="342900" indent="-342900">
+              <a:buFont typeface="Arial"/>
+              <a:buChar char="•"/>
+            </a:pPr>
+            <a:r>
+              <a:rPr lang="en-US" sz="2400" b="1" dirty="0">
+                <a:solidFill>
+                  <a:schemeClr val="accent1"/>
+                </a:solidFill>
+                <a:latin typeface="Cambria" panose="02040503050406030204" pitchFamily="18" charset="0"/>
+              </a:rPr>
+              <a:t>REPRODUCIBILITY?</a:t>
+            </a:r>
+            <a:br>
+              <a:rPr lang="en-US" sz="2400" b="1" dirty="0">
+                <a:solidFill>
+                  <a:schemeClr val="accent1"/>
+                </a:solidFill>
+                <a:latin typeface="Cambria" panose="02040503050406030204" pitchFamily="18" charset="0"/>
+              </a:rPr>
+            </a:br>
+            <a:endParaRPr lang="en-US" sz="2400" b="1" dirty="0">
+              <a:solidFill>
+                <a:schemeClr val="accent1"/>
+              </a:solidFill>
+              <a:latin typeface="Cambria" panose="02040503050406030204" pitchFamily="18" charset="0"/>
+            </a:endParaRPr>
           </a:p>
         </p:txBody>
       </p:sp>
     </p:spTree>
     <p:extLst>
       <p:ext uri="{BB962C8B-B14F-4D97-AF65-F5344CB8AC3E}">
-        <p14:creationId xmlns:p14="http://schemas.microsoft.com/office/powerpoint/2010/main" val="1581891547"/>
+        <p14:creationId xmlns:p14="http://schemas.microsoft.com/office/powerpoint/2010/main" val="4166614193"/>
       </p:ext>
     </p:extLst>
   </p:cSld>
@@ -5014,7 +6095,7 @@
         <p:spPr>
           <a:xfrm>
             <a:off x="1271768" y="1115051"/>
-            <a:ext cx="9196386" cy="630942"/>
+            <a:ext cx="9196386" cy="553998"/>
           </a:xfrm>
           <a:prstGeom prst="rect">
             <a:avLst/>
@@ -5028,21 +6109,201 @@
           <a:lstStyle/>
           <a:p>
             <a:r>
-              <a:rPr lang="en-US" sz="3500" b="1" dirty="0">
+              <a:rPr lang="en-US" sz="3000" b="1" dirty="0">
                 <a:solidFill>
                   <a:schemeClr val="accent1"/>
                 </a:solidFill>
                 <a:latin typeface="Cambria" panose="02040503050406030204" pitchFamily="18" charset="0"/>
               </a:rPr>
-              <a:t>DATA GREEDINESS</a:t>
-            </a:r>
+              <a:t>INDUSTRIALIZED AI</a:t>
+            </a:r>
+          </a:p>
+        </p:txBody>
+      </p:sp>
+      <p:sp>
+        <p:nvSpPr>
+          <p:cNvPr id="6" name="TextBox 5">
+            <a:extLst>
+              <a:ext uri="{FF2B5EF4-FFF2-40B4-BE49-F238E27FC236}">
+                <a16:creationId xmlns:a16="http://schemas.microsoft.com/office/drawing/2014/main" id="{80CDDE41-8C09-D54C-917C-9FB77CE4824D}"/>
+              </a:ext>
+            </a:extLst>
+          </p:cNvPr>
+          <p:cNvSpPr txBox="1"/>
+          <p:nvPr/>
+        </p:nvSpPr>
+        <p:spPr>
+          <a:xfrm>
+            <a:off x="1275701" y="2333156"/>
+            <a:ext cx="9909364" cy="2677656"/>
+          </a:xfrm>
+          <a:prstGeom prst="rect">
+            <a:avLst/>
+          </a:prstGeom>
+          <a:noFill/>
+        </p:spPr>
+        <p:txBody>
+          <a:bodyPr wrap="square" rtlCol="0">
+            <a:spAutoFit/>
+          </a:bodyPr>
+          <a:lstStyle/>
+          <a:p>
+            <a:pPr marL="342900" indent="-342900">
+              <a:buFont typeface="Arial"/>
+              <a:buChar char="•"/>
+            </a:pPr>
+            <a:r>
+              <a:rPr lang="en-US" sz="2400" b="1" dirty="0">
+                <a:solidFill>
+                  <a:schemeClr val="accent1"/>
+                </a:solidFill>
+                <a:latin typeface="Cambria" panose="02040503050406030204" pitchFamily="18" charset="0"/>
+              </a:rPr>
+              <a:t>STILL MAINLY ARTISANAL &amp; HAND-CRAFTED</a:t>
+            </a:r>
+            <a:br>
+              <a:rPr lang="en-US" sz="2400" b="1" dirty="0">
+                <a:solidFill>
+                  <a:schemeClr val="accent1"/>
+                </a:solidFill>
+                <a:latin typeface="Cambria" panose="02040503050406030204" pitchFamily="18" charset="0"/>
+              </a:rPr>
+            </a:br>
+            <a:endParaRPr lang="en-US" sz="2400" b="1" dirty="0">
+              <a:solidFill>
+                <a:schemeClr val="accent1"/>
+              </a:solidFill>
+              <a:latin typeface="Cambria" panose="02040503050406030204" pitchFamily="18" charset="0"/>
+            </a:endParaRPr>
+          </a:p>
+          <a:p>
+            <a:pPr marL="342900" indent="-342900">
+              <a:buFont typeface="Arial"/>
+              <a:buChar char="•"/>
+            </a:pPr>
+            <a:r>
+              <a:rPr lang="en-US" sz="2400" b="1" dirty="0">
+                <a:solidFill>
+                  <a:schemeClr val="accent1"/>
+                </a:solidFill>
+                <a:latin typeface="Cambria" panose="02040503050406030204" pitchFamily="18" charset="0"/>
+              </a:rPr>
+              <a:t>REPRODUCIBILITY/STANDARDIZATION FOR INDUSTRIAL DEPLOYMENT</a:t>
+            </a:r>
+            <a:br>
+              <a:rPr lang="en-US" sz="2400" b="1" dirty="0">
+                <a:solidFill>
+                  <a:schemeClr val="accent1"/>
+                </a:solidFill>
+                <a:latin typeface="Cambria" panose="02040503050406030204" pitchFamily="18" charset="0"/>
+              </a:rPr>
+            </a:br>
+            <a:r>
+              <a:rPr lang="en-US" sz="2400" b="1" dirty="0">
+                <a:solidFill>
+                  <a:schemeClr val="accent1"/>
+                </a:solidFill>
+                <a:latin typeface="Cambria" panose="02040503050406030204" pitchFamily="18" charset="0"/>
+              </a:rPr>
+              <a:t> </a:t>
+            </a:r>
+          </a:p>
+          <a:p>
+            <a:pPr marL="342900" indent="-342900">
+              <a:buFont typeface="Arial"/>
+              <a:buChar char="•"/>
+            </a:pPr>
+            <a:r>
+              <a:rPr lang="en-US" sz="2400" b="1" dirty="0">
+                <a:solidFill>
+                  <a:schemeClr val="accent1"/>
+                </a:solidFill>
+                <a:latin typeface="Cambria" panose="02040503050406030204" pitchFamily="18" charset="0"/>
+              </a:rPr>
+              <a:t>TOOLS, METHODOLOGIES AND HR</a:t>
+            </a:r>
+            <a:br>
+              <a:rPr lang="en-US" sz="2400" b="1" dirty="0">
+                <a:solidFill>
+                  <a:schemeClr val="accent1"/>
+                </a:solidFill>
+                <a:latin typeface="Cambria" panose="02040503050406030204" pitchFamily="18" charset="0"/>
+              </a:rPr>
+            </a:br>
+            <a:endParaRPr lang="en-US" sz="2400" b="1" dirty="0">
+              <a:solidFill>
+                <a:schemeClr val="accent1"/>
+              </a:solidFill>
+              <a:latin typeface="Cambria" panose="02040503050406030204" pitchFamily="18" charset="0"/>
+            </a:endParaRPr>
+          </a:p>
+        </p:txBody>
+      </p:sp>
+      <p:sp>
+        <p:nvSpPr>
+          <p:cNvPr id="2" name="Rectangle 1">
+            <a:extLst>
+              <a:ext uri="{FF2B5EF4-FFF2-40B4-BE49-F238E27FC236}">
+                <a16:creationId xmlns:a16="http://schemas.microsoft.com/office/drawing/2014/main" id="{9C881274-35C7-DD44-90EF-A4093AAAC2D9}"/>
+              </a:ext>
+            </a:extLst>
+          </p:cNvPr>
+          <p:cNvSpPr/>
+          <p:nvPr/>
+        </p:nvSpPr>
+        <p:spPr>
+          <a:xfrm>
+            <a:off x="1271768" y="5429935"/>
+            <a:ext cx="9387840" cy="369332"/>
+          </a:xfrm>
+          <a:prstGeom prst="rect">
+            <a:avLst/>
+          </a:prstGeom>
+        </p:spPr>
+        <p:txBody>
+          <a:bodyPr wrap="square">
+            <a:spAutoFit/>
+          </a:bodyPr>
+          <a:lstStyle/>
+          <a:p>
+            <a:r>
+              <a:rPr lang="fr-FR" dirty="0">
+                <a:hlinkClick r:id="rId3"/>
+              </a:rPr>
+              <a:t>https://</a:t>
+            </a:r>
+            <a:r>
+              <a:rPr lang="fr-FR" dirty="0" err="1">
+                <a:hlinkClick r:id="rId3"/>
+              </a:rPr>
+              <a:t>medium.com</a:t>
+            </a:r>
+            <a:r>
+              <a:rPr lang="fr-FR" dirty="0">
+                <a:hlinkClick r:id="rId3"/>
+              </a:rPr>
+              <a:t>/@</a:t>
+            </a:r>
+            <a:r>
+              <a:rPr lang="fr-FR" dirty="0" err="1">
+                <a:hlinkClick r:id="rId3"/>
+              </a:rPr>
+              <a:t>Petuum</a:t>
+            </a:r>
+            <a:r>
+              <a:rPr lang="fr-FR" dirty="0">
+                <a:hlinkClick r:id="rId3"/>
+              </a:rPr>
+              <a:t>/what-is-industrialized-ai-and-why-is-it-important-42c0ee652113</a:t>
+            </a:r>
+            <a:endParaRPr lang="fr-FR" dirty="0"/>
           </a:p>
         </p:txBody>
       </p:sp>
     </p:spTree>
     <p:extLst>
       <p:ext uri="{BB962C8B-B14F-4D97-AF65-F5344CB8AC3E}">
-        <p14:creationId xmlns:p14="http://schemas.microsoft.com/office/powerpoint/2010/main" val="1108266415"/>
+        <p14:creationId xmlns:p14="http://schemas.microsoft.com/office/powerpoint/2010/main" val="4066552282"/>
       </p:ext>
     </p:extLst>
   </p:cSld>
@@ -5090,7 +6351,7 @@
         <p:spPr>
           <a:xfrm>
             <a:off x="1271768" y="1115051"/>
-            <a:ext cx="9196386" cy="1169551"/>
+            <a:ext cx="9196386" cy="553998"/>
           </a:xfrm>
           <a:prstGeom prst="rect">
             <a:avLst/>
@@ -5104,21 +6365,238 @@
           <a:lstStyle/>
           <a:p>
             <a:r>
-              <a:rPr lang="en-US" sz="3500" b="1" dirty="0">
+              <a:rPr lang="en-US" sz="3000" b="1" dirty="0">
                 <a:solidFill>
                   <a:schemeClr val="accent1"/>
                 </a:solidFill>
                 <a:latin typeface="Cambria" panose="02040503050406030204" pitchFamily="18" charset="0"/>
               </a:rPr>
-              <a:t>ENTREPRENEURS &amp; VENTURE CAPITAL ECOSYSTEMS</a:t>
-            </a:r>
+              <a:t>REPRODUCIBILITY OF AI RESEARCH PAPERS</a:t>
+            </a:r>
+          </a:p>
+        </p:txBody>
+      </p:sp>
+      <p:sp>
+        <p:nvSpPr>
+          <p:cNvPr id="6" name="TextBox 5">
+            <a:extLst>
+              <a:ext uri="{FF2B5EF4-FFF2-40B4-BE49-F238E27FC236}">
+                <a16:creationId xmlns:a16="http://schemas.microsoft.com/office/drawing/2014/main" id="{80CDDE41-8C09-D54C-917C-9FB77CE4824D}"/>
+              </a:ext>
+            </a:extLst>
+          </p:cNvPr>
+          <p:cNvSpPr txBox="1"/>
+          <p:nvPr/>
+        </p:nvSpPr>
+        <p:spPr>
+          <a:xfrm>
+            <a:off x="1275701" y="2333156"/>
+            <a:ext cx="9909364" cy="2308324"/>
+          </a:xfrm>
+          <a:prstGeom prst="rect">
+            <a:avLst/>
+          </a:prstGeom>
+          <a:noFill/>
+        </p:spPr>
+        <p:txBody>
+          <a:bodyPr wrap="square" rtlCol="0">
+            <a:spAutoFit/>
+          </a:bodyPr>
+          <a:lstStyle/>
+          <a:p>
+            <a:pPr marL="342900" indent="-342900">
+              <a:buFont typeface="Arial"/>
+              <a:buChar char="•"/>
+            </a:pPr>
+            <a:r>
+              <a:rPr lang="en-US" sz="2400" b="1" dirty="0">
+                <a:solidFill>
+                  <a:schemeClr val="accent1"/>
+                </a:solidFill>
+                <a:latin typeface="Cambria" panose="02040503050406030204" pitchFamily="18" charset="0"/>
+              </a:rPr>
+              <a:t>THE NOW PERVASIVE JUPYTER NOTEBOOKS </a:t>
+            </a:r>
+            <a:br>
+              <a:rPr lang="en-US" sz="2400" b="1" dirty="0">
+                <a:solidFill>
+                  <a:schemeClr val="accent1"/>
+                </a:solidFill>
+                <a:latin typeface="Cambria" panose="02040503050406030204" pitchFamily="18" charset="0"/>
+              </a:rPr>
+            </a:br>
+            <a:endParaRPr lang="en-US" sz="2400" b="1" dirty="0">
+              <a:solidFill>
+                <a:schemeClr val="accent1"/>
+              </a:solidFill>
+              <a:latin typeface="Cambria" panose="02040503050406030204" pitchFamily="18" charset="0"/>
+            </a:endParaRPr>
+          </a:p>
+          <a:p>
+            <a:pPr marL="342900" indent="-342900">
+              <a:buFont typeface="Arial"/>
+              <a:buChar char="•"/>
+            </a:pPr>
+            <a:r>
+              <a:rPr lang="en-US" sz="2400" b="1" dirty="0">
+                <a:solidFill>
+                  <a:schemeClr val="accent1"/>
+                </a:solidFill>
+                <a:latin typeface="Cambria" panose="02040503050406030204" pitchFamily="18" charset="0"/>
+              </a:rPr>
+              <a:t>OPEN-SOURCE AND GITHUB-LIKE CODE REPOSITORIES</a:t>
+            </a:r>
+            <a:br>
+              <a:rPr lang="en-US" sz="2400" b="1" dirty="0">
+                <a:solidFill>
+                  <a:schemeClr val="accent1"/>
+                </a:solidFill>
+                <a:latin typeface="Cambria" panose="02040503050406030204" pitchFamily="18" charset="0"/>
+              </a:rPr>
+            </a:br>
+            <a:r>
+              <a:rPr lang="en-US" sz="2400" b="1" dirty="0">
+                <a:solidFill>
+                  <a:schemeClr val="accent1"/>
+                </a:solidFill>
+                <a:latin typeface="Cambria" panose="02040503050406030204" pitchFamily="18" charset="0"/>
+              </a:rPr>
+              <a:t> </a:t>
+            </a:r>
+          </a:p>
+          <a:p>
+            <a:pPr marL="342900" indent="-342900">
+              <a:buFont typeface="Arial"/>
+              <a:buChar char="•"/>
+            </a:pPr>
+            <a:r>
+              <a:rPr lang="en-US" sz="2400" b="1" dirty="0">
+                <a:solidFill>
+                  <a:schemeClr val="accent1"/>
+                </a:solidFill>
+                <a:latin typeface="Cambria" panose="02040503050406030204" pitchFamily="18" charset="0"/>
+              </a:rPr>
+              <a:t>COMPUTING ENVIRONEMENTS AND POWER</a:t>
+            </a:r>
+            <a:br>
+              <a:rPr lang="en-US" sz="2400" b="1" dirty="0">
+                <a:solidFill>
+                  <a:schemeClr val="accent1"/>
+                </a:solidFill>
+                <a:latin typeface="Cambria" panose="02040503050406030204" pitchFamily="18" charset="0"/>
+              </a:rPr>
+            </a:br>
+            <a:endParaRPr lang="en-US" sz="2400" b="1" dirty="0">
+              <a:solidFill>
+                <a:schemeClr val="accent1"/>
+              </a:solidFill>
+              <a:latin typeface="Cambria" panose="02040503050406030204" pitchFamily="18" charset="0"/>
+            </a:endParaRPr>
+          </a:p>
+        </p:txBody>
+      </p:sp>
+      <p:sp>
+        <p:nvSpPr>
+          <p:cNvPr id="3" name="Rectangle 2">
+            <a:extLst>
+              <a:ext uri="{FF2B5EF4-FFF2-40B4-BE49-F238E27FC236}">
+                <a16:creationId xmlns:a16="http://schemas.microsoft.com/office/drawing/2014/main" id="{95F4BF44-01E4-1244-82A7-A1E9E34470A9}"/>
+              </a:ext>
+            </a:extLst>
+          </p:cNvPr>
+          <p:cNvSpPr/>
+          <p:nvPr/>
+        </p:nvSpPr>
+        <p:spPr>
+          <a:xfrm>
+            <a:off x="1271768" y="5120921"/>
+            <a:ext cx="5352491" cy="369332"/>
+          </a:xfrm>
+          <a:prstGeom prst="rect">
+            <a:avLst/>
+          </a:prstGeom>
+        </p:spPr>
+        <p:txBody>
+          <a:bodyPr wrap="none">
+            <a:spAutoFit/>
+          </a:bodyPr>
+          <a:lstStyle/>
+          <a:p>
+            <a:r>
+              <a:rPr lang="fr-FR" dirty="0">
+                <a:hlinkClick r:id="rId3"/>
+              </a:rPr>
+              <a:t>https://</a:t>
+            </a:r>
+            <a:r>
+              <a:rPr lang="fr-FR" dirty="0" err="1">
+                <a:hlinkClick r:id="rId3"/>
+              </a:rPr>
+              <a:t>www.nature.com</a:t>
+            </a:r>
+            <a:r>
+              <a:rPr lang="fr-FR" dirty="0">
+                <a:hlinkClick r:id="rId3"/>
+              </a:rPr>
+              <a:t>/articles/d41586-018-07196-1</a:t>
+            </a:r>
+            <a:endParaRPr lang="fr-FR" dirty="0"/>
+          </a:p>
+        </p:txBody>
+      </p:sp>
+      <p:sp>
+        <p:nvSpPr>
+          <p:cNvPr id="4" name="Rectangle 3">
+            <a:extLst>
+              <a:ext uri="{FF2B5EF4-FFF2-40B4-BE49-F238E27FC236}">
+                <a16:creationId xmlns:a16="http://schemas.microsoft.com/office/drawing/2014/main" id="{7353E6E4-C45C-FE48-8E22-BCBB9421F44F}"/>
+              </a:ext>
+            </a:extLst>
+          </p:cNvPr>
+          <p:cNvSpPr/>
+          <p:nvPr/>
+        </p:nvSpPr>
+        <p:spPr>
+          <a:xfrm>
+            <a:off x="1271768" y="5490253"/>
+            <a:ext cx="3506857" cy="369332"/>
+          </a:xfrm>
+          <a:prstGeom prst="rect">
+            <a:avLst/>
+          </a:prstGeom>
+        </p:spPr>
+        <p:txBody>
+          <a:bodyPr wrap="none">
+            <a:spAutoFit/>
+          </a:bodyPr>
+          <a:lstStyle/>
+          <a:p>
+            <a:r>
+              <a:rPr lang="fr-FR" dirty="0">
+                <a:hlinkClick r:id="rId4"/>
+              </a:rPr>
+              <a:t>https://</a:t>
+            </a:r>
+            <a:r>
+              <a:rPr lang="fr-FR" dirty="0" err="1">
+                <a:hlinkClick r:id="rId4"/>
+              </a:rPr>
+              <a:t>colab.research.google.com</a:t>
+            </a:r>
+            <a:r>
+              <a:rPr lang="fr-FR" dirty="0">
+                <a:hlinkClick r:id="rId4"/>
+              </a:rPr>
+              <a:t>/</a:t>
+            </a:r>
+            <a:endParaRPr lang="fr-FR" dirty="0"/>
           </a:p>
         </p:txBody>
       </p:sp>
     </p:spTree>
     <p:extLst>
       <p:ext uri="{BB962C8B-B14F-4D97-AF65-F5344CB8AC3E}">
-        <p14:creationId xmlns:p14="http://schemas.microsoft.com/office/powerpoint/2010/main" val="983120470"/>
+        <p14:creationId xmlns:p14="http://schemas.microsoft.com/office/powerpoint/2010/main" val="513472006"/>
       </p:ext>
     </p:extLst>
   </p:cSld>
@@ -5166,7 +6644,7 @@
         <p:spPr>
           <a:xfrm>
             <a:off x="1271768" y="1115051"/>
-            <a:ext cx="9196386" cy="630942"/>
+            <a:ext cx="9196386" cy="553998"/>
           </a:xfrm>
           <a:prstGeom prst="rect">
             <a:avLst/>
@@ -5180,21 +6658,364 @@
           <a:lstStyle/>
           <a:p>
             <a:r>
-              <a:rPr lang="en-US" sz="3500" b="1" dirty="0">
+              <a:rPr lang="en-US" sz="3000" b="1" dirty="0">
                 <a:solidFill>
                   <a:schemeClr val="accent1"/>
                 </a:solidFill>
                 <a:latin typeface="Cambria" panose="02040503050406030204" pitchFamily="18" charset="0"/>
               </a:rPr>
-              <a:t>THE WINNER-TAKE ALL ECONOMICS</a:t>
-            </a:r>
+              <a:t>AI DEMOCRATIZATION</a:t>
+            </a:r>
+          </a:p>
+        </p:txBody>
+      </p:sp>
+      <p:sp>
+        <p:nvSpPr>
+          <p:cNvPr id="6" name="TextBox 5">
+            <a:extLst>
+              <a:ext uri="{FF2B5EF4-FFF2-40B4-BE49-F238E27FC236}">
+                <a16:creationId xmlns:a16="http://schemas.microsoft.com/office/drawing/2014/main" id="{80CDDE41-8C09-D54C-917C-9FB77CE4824D}"/>
+              </a:ext>
+            </a:extLst>
+          </p:cNvPr>
+          <p:cNvSpPr txBox="1"/>
+          <p:nvPr/>
+        </p:nvSpPr>
+        <p:spPr>
+          <a:xfrm>
+            <a:off x="1275701" y="2333156"/>
+            <a:ext cx="9909364" cy="2308324"/>
+          </a:xfrm>
+          <a:prstGeom prst="rect">
+            <a:avLst/>
+          </a:prstGeom>
+          <a:noFill/>
+        </p:spPr>
+        <p:txBody>
+          <a:bodyPr wrap="square" rtlCol="0">
+            <a:spAutoFit/>
+          </a:bodyPr>
+          <a:lstStyle/>
+          <a:p>
+            <a:pPr marL="342900" indent="-342900">
+              <a:buFont typeface="Arial"/>
+              <a:buChar char="•"/>
+            </a:pPr>
+            <a:r>
+              <a:rPr lang="en-US" sz="2400" b="1" dirty="0">
+                <a:solidFill>
+                  <a:schemeClr val="accent1"/>
+                </a:solidFill>
+                <a:latin typeface="Cambria" panose="02040503050406030204" pitchFamily="18" charset="0"/>
+              </a:rPr>
+              <a:t>ONLINE COURSES</a:t>
+            </a:r>
+            <a:br>
+              <a:rPr lang="en-US" sz="2400" b="1" dirty="0">
+                <a:solidFill>
+                  <a:schemeClr val="accent1"/>
+                </a:solidFill>
+                <a:latin typeface="Cambria" panose="02040503050406030204" pitchFamily="18" charset="0"/>
+              </a:rPr>
+            </a:br>
+            <a:endParaRPr lang="en-US" sz="2400" b="1" dirty="0">
+              <a:solidFill>
+                <a:schemeClr val="accent1"/>
+              </a:solidFill>
+              <a:latin typeface="Cambria" panose="02040503050406030204" pitchFamily="18" charset="0"/>
+            </a:endParaRPr>
+          </a:p>
+          <a:p>
+            <a:pPr marL="342900" indent="-342900">
+              <a:buFont typeface="Arial"/>
+              <a:buChar char="•"/>
+            </a:pPr>
+            <a:r>
+              <a:rPr lang="en-US" sz="2400" b="1" dirty="0">
+                <a:solidFill>
+                  <a:schemeClr val="accent1"/>
+                </a:solidFill>
+                <a:latin typeface="Cambria" panose="02040503050406030204" pitchFamily="18" charset="0"/>
+              </a:rPr>
+              <a:t>BEST PRACTICES</a:t>
+            </a:r>
+            <a:br>
+              <a:rPr lang="en-US" sz="2400" b="1" dirty="0">
+                <a:solidFill>
+                  <a:schemeClr val="accent1"/>
+                </a:solidFill>
+                <a:latin typeface="Cambria" panose="02040503050406030204" pitchFamily="18" charset="0"/>
+              </a:rPr>
+            </a:br>
+            <a:endParaRPr lang="en-US" sz="2400" b="1" dirty="0">
+              <a:solidFill>
+                <a:schemeClr val="accent1"/>
+              </a:solidFill>
+              <a:latin typeface="Cambria" panose="02040503050406030204" pitchFamily="18" charset="0"/>
+            </a:endParaRPr>
+          </a:p>
+          <a:p>
+            <a:pPr marL="342900" indent="-342900">
+              <a:buFont typeface="Arial"/>
+              <a:buChar char="•"/>
+            </a:pPr>
+            <a:r>
+              <a:rPr lang="en-US" sz="2400" b="1" dirty="0">
+                <a:solidFill>
+                  <a:schemeClr val="accent1"/>
+                </a:solidFill>
+                <a:latin typeface="Cambria" panose="02040503050406030204" pitchFamily="18" charset="0"/>
+              </a:rPr>
+              <a:t>COMPETITIONS</a:t>
+            </a:r>
+            <a:br>
+              <a:rPr lang="en-US" sz="2400" b="1" dirty="0">
+                <a:solidFill>
+                  <a:schemeClr val="accent1"/>
+                </a:solidFill>
+                <a:latin typeface="Cambria" panose="02040503050406030204" pitchFamily="18" charset="0"/>
+              </a:rPr>
+            </a:br>
+            <a:endParaRPr lang="en-US" sz="2400" b="1" dirty="0">
+              <a:solidFill>
+                <a:schemeClr val="accent1"/>
+              </a:solidFill>
+              <a:latin typeface="Cambria" panose="02040503050406030204" pitchFamily="18" charset="0"/>
+            </a:endParaRPr>
+          </a:p>
+        </p:txBody>
+      </p:sp>
+      <p:sp>
+        <p:nvSpPr>
+          <p:cNvPr id="2" name="Rectangle 1">
+            <a:extLst>
+              <a:ext uri="{FF2B5EF4-FFF2-40B4-BE49-F238E27FC236}">
+                <a16:creationId xmlns:a16="http://schemas.microsoft.com/office/drawing/2014/main" id="{9C881274-35C7-DD44-90EF-A4093AAAC2D9}"/>
+              </a:ext>
+            </a:extLst>
+          </p:cNvPr>
+          <p:cNvSpPr/>
+          <p:nvPr/>
+        </p:nvSpPr>
+        <p:spPr>
+          <a:xfrm>
+            <a:off x="1271768" y="5056555"/>
+            <a:ext cx="9387840" cy="369332"/>
+          </a:xfrm>
+          <a:prstGeom prst="rect">
+            <a:avLst/>
+          </a:prstGeom>
+        </p:spPr>
+        <p:txBody>
+          <a:bodyPr wrap="square">
+            <a:spAutoFit/>
+          </a:bodyPr>
+          <a:lstStyle/>
+          <a:p>
+            <a:r>
+              <a:rPr lang="fr-FR" dirty="0">
+                <a:hlinkClick r:id="rId3"/>
+              </a:rPr>
+              <a:t>https://www.deeplearning.ai/</a:t>
+            </a:r>
+            <a:endParaRPr lang="fr-FR" dirty="0"/>
+          </a:p>
+        </p:txBody>
+      </p:sp>
+      <p:sp>
+        <p:nvSpPr>
+          <p:cNvPr id="3" name="Rectangle 2">
+            <a:extLst>
+              <a:ext uri="{FF2B5EF4-FFF2-40B4-BE49-F238E27FC236}">
+                <a16:creationId xmlns:a16="http://schemas.microsoft.com/office/drawing/2014/main" id="{44390A30-7304-D347-93B6-D7A925027985}"/>
+              </a:ext>
+            </a:extLst>
+          </p:cNvPr>
+          <p:cNvSpPr/>
+          <p:nvPr/>
+        </p:nvSpPr>
+        <p:spPr>
+          <a:xfrm>
+            <a:off x="1271768" y="5324594"/>
+            <a:ext cx="2094869" cy="369332"/>
+          </a:xfrm>
+          <a:prstGeom prst="rect">
+            <a:avLst/>
+          </a:prstGeom>
+        </p:spPr>
+        <p:txBody>
+          <a:bodyPr wrap="none">
+            <a:spAutoFit/>
+          </a:bodyPr>
+          <a:lstStyle/>
+          <a:p>
+            <a:r>
+              <a:rPr lang="fr-FR" dirty="0">
+                <a:hlinkClick r:id="rId4"/>
+              </a:rPr>
+              <a:t>https://</a:t>
+            </a:r>
+            <a:r>
+              <a:rPr lang="fr-FR" dirty="0" err="1">
+                <a:hlinkClick r:id="rId4"/>
+              </a:rPr>
+              <a:t>www.fast.ai</a:t>
+            </a:r>
+            <a:r>
+              <a:rPr lang="fr-FR" dirty="0">
+                <a:hlinkClick r:id="rId4"/>
+              </a:rPr>
+              <a:t>/</a:t>
+            </a:r>
+            <a:endParaRPr lang="fr-FR" dirty="0"/>
+          </a:p>
+        </p:txBody>
+      </p:sp>
+      <p:sp>
+        <p:nvSpPr>
+          <p:cNvPr id="7" name="Rectangle 6">
+            <a:extLst>
+              <a:ext uri="{FF2B5EF4-FFF2-40B4-BE49-F238E27FC236}">
+                <a16:creationId xmlns:a16="http://schemas.microsoft.com/office/drawing/2014/main" id="{EFF1D905-FBB1-1440-9205-AFA8ACF08CAB}"/>
+              </a:ext>
+            </a:extLst>
+          </p:cNvPr>
+          <p:cNvSpPr/>
+          <p:nvPr/>
+        </p:nvSpPr>
+        <p:spPr>
+          <a:xfrm>
+            <a:off x="1271768" y="5595758"/>
+            <a:ext cx="2418675" cy="369332"/>
+          </a:xfrm>
+          <a:prstGeom prst="rect">
+            <a:avLst/>
+          </a:prstGeom>
+        </p:spPr>
+        <p:txBody>
+          <a:bodyPr wrap="none">
+            <a:spAutoFit/>
+          </a:bodyPr>
+          <a:lstStyle/>
+          <a:p>
+            <a:r>
+              <a:rPr lang="fr-FR" dirty="0">
+                <a:hlinkClick r:id="rId5"/>
+              </a:rPr>
+              <a:t>https://eu.udacity.com/</a:t>
+            </a:r>
+            <a:endParaRPr lang="fr-FR" dirty="0"/>
+          </a:p>
+        </p:txBody>
+      </p:sp>
+      <p:sp>
+        <p:nvSpPr>
+          <p:cNvPr id="4" name="Rectangle 3">
+            <a:extLst>
+              <a:ext uri="{FF2B5EF4-FFF2-40B4-BE49-F238E27FC236}">
+                <a16:creationId xmlns:a16="http://schemas.microsoft.com/office/drawing/2014/main" id="{555DB889-98E4-284A-8499-BD834C07FAC4}"/>
+              </a:ext>
+            </a:extLst>
+          </p:cNvPr>
+          <p:cNvSpPr/>
+          <p:nvPr/>
+        </p:nvSpPr>
+        <p:spPr>
+          <a:xfrm>
+            <a:off x="1271768" y="5868203"/>
+            <a:ext cx="2872838" cy="369332"/>
+          </a:xfrm>
+          <a:prstGeom prst="rect">
+            <a:avLst/>
+          </a:prstGeom>
+        </p:spPr>
+        <p:txBody>
+          <a:bodyPr wrap="none">
+            <a:spAutoFit/>
+          </a:bodyPr>
+          <a:lstStyle/>
+          <a:p>
+            <a:r>
+              <a:rPr lang="fr-FR" dirty="0">
+                <a:hlinkClick r:id="rId6"/>
+              </a:rPr>
+              <a:t>http://</a:t>
+            </a:r>
+            <a:r>
+              <a:rPr lang="fr-FR" dirty="0" err="1">
+                <a:hlinkClick r:id="rId6"/>
+              </a:rPr>
+              <a:t>www.mlyearning.org</a:t>
+            </a:r>
+            <a:r>
+              <a:rPr lang="fr-FR" dirty="0">
+                <a:hlinkClick r:id="rId6"/>
+              </a:rPr>
+              <a:t>/</a:t>
+            </a:r>
+            <a:endParaRPr lang="fr-FR" dirty="0"/>
+          </a:p>
+        </p:txBody>
+      </p:sp>
+      <p:sp>
+        <p:nvSpPr>
+          <p:cNvPr id="5" name="Rectangle 4">
+            <a:extLst>
+              <a:ext uri="{FF2B5EF4-FFF2-40B4-BE49-F238E27FC236}">
+                <a16:creationId xmlns:a16="http://schemas.microsoft.com/office/drawing/2014/main" id="{663BED60-1181-CC41-93FB-EA8A167EE6F3}"/>
+              </a:ext>
+            </a:extLst>
+          </p:cNvPr>
+          <p:cNvSpPr/>
+          <p:nvPr/>
+        </p:nvSpPr>
+        <p:spPr>
+          <a:xfrm>
+            <a:off x="1271768" y="6162227"/>
+            <a:ext cx="3823354" cy="369332"/>
+          </a:xfrm>
+          <a:prstGeom prst="rect">
+            <a:avLst/>
+          </a:prstGeom>
+        </p:spPr>
+        <p:txBody>
+          <a:bodyPr wrap="none">
+            <a:spAutoFit/>
+          </a:bodyPr>
+          <a:lstStyle/>
+          <a:p>
+            <a:r>
+              <a:rPr lang="fr-FR" dirty="0">
+                <a:hlinkClick r:id="rId7"/>
+              </a:rPr>
+              <a:t>https://</a:t>
+            </a:r>
+            <a:r>
+              <a:rPr lang="fr-FR" dirty="0" err="1">
+                <a:hlinkClick r:id="rId7"/>
+              </a:rPr>
+              <a:t>www.kaggle.com</a:t>
+            </a:r>
+            <a:r>
+              <a:rPr lang="fr-FR" dirty="0">
+                <a:hlinkClick r:id="rId7"/>
+              </a:rPr>
+              <a:t>/</a:t>
+            </a:r>
+            <a:r>
+              <a:rPr lang="fr-FR" dirty="0" err="1">
+                <a:hlinkClick r:id="rId7"/>
+              </a:rPr>
+              <a:t>competitions</a:t>
+            </a:r>
+            <a:endParaRPr lang="fr-FR" dirty="0"/>
           </a:p>
         </p:txBody>
       </p:sp>
     </p:spTree>
     <p:extLst>
       <p:ext uri="{BB962C8B-B14F-4D97-AF65-F5344CB8AC3E}">
-        <p14:creationId xmlns:p14="http://schemas.microsoft.com/office/powerpoint/2010/main" val="3740597422"/>
+        <p14:creationId xmlns:p14="http://schemas.microsoft.com/office/powerpoint/2010/main" val="643803180"/>
       </p:ext>
     </p:extLst>
   </p:cSld>

</xml_diff>